<commit_message>
del sensitive data & fix article link
</commit_message>
<xml_diff>
--- a/document/rabbitmq分享.pptx
+++ b/document/rabbitmq分享.pptx
@@ -110,6 +110,11 @@
       </a:defRPr>
     </a:lvl9pPr>
   </p:defaultTextStyle>
+  <p:extLst>
+    <p:ext uri="{EFAFB233-063F-42B5-8137-9DF3F51BA10A}">
+      <p15:sldGuideLst xmlns:p15="http://schemas.microsoft.com/office/powerpoint/2012/main"/>
+    </p:ext>
+  </p:extLst>
 </p:presentation>
 </file>
 
@@ -299,7 +304,7 @@
           <a:p>
             <a:fld id="{4AAD347D-5ACD-4C99-B74B-A9C85AD731AF}" type="datetimeFigureOut">
               <a:rPr lang="en-US" dirty="0"/>
-              <a:t>8/9/2016</a:t>
+              <a:t>3/4/2017</a:t>
             </a:fld>
             <a:endParaRPr lang="en-US" dirty="0"/>
           </a:p>
@@ -569,7 +574,7 @@
           <a:p>
             <a:fld id="{4509A250-FF31-4206-8172-F9D3106AACB1}" type="datetimeFigureOut">
               <a:rPr lang="en-US" dirty="0"/>
-              <a:t>8/9/2016</a:t>
+              <a:t>3/4/2017</a:t>
             </a:fld>
             <a:endParaRPr lang="en-US" dirty="0"/>
           </a:p>
@@ -758,7 +763,7 @@
           <a:p>
             <a:fld id="{4509A250-FF31-4206-8172-F9D3106AACB1}" type="datetimeFigureOut">
               <a:rPr lang="en-US" dirty="0"/>
-              <a:t>8/9/2016</a:t>
+              <a:t>3/4/2017</a:t>
             </a:fld>
             <a:endParaRPr lang="en-US" dirty="0"/>
           </a:p>
@@ -1026,7 +1031,7 @@
           <a:p>
             <a:fld id="{4509A250-FF31-4206-8172-F9D3106AACB1}" type="datetimeFigureOut">
               <a:rPr lang="en-US" dirty="0"/>
-              <a:t>8/9/2016</a:t>
+              <a:t>3/4/2017</a:t>
             </a:fld>
             <a:endParaRPr lang="en-US" dirty="0"/>
           </a:p>
@@ -1362,7 +1367,7 @@
           <a:p>
             <a:fld id="{4509A250-FF31-4206-8172-F9D3106AACB1}" type="datetimeFigureOut">
               <a:rPr lang="en-US" dirty="0"/>
-              <a:t>8/9/2016</a:t>
+              <a:t>3/4/2017</a:t>
             </a:fld>
             <a:endParaRPr lang="en-US" dirty="0"/>
           </a:p>
@@ -1980,7 +1985,7 @@
           <a:p>
             <a:fld id="{4509A250-FF31-4206-8172-F9D3106AACB1}" type="datetimeFigureOut">
               <a:rPr lang="en-US" dirty="0"/>
-              <a:t>8/9/2016</a:t>
+              <a:t>3/4/2017</a:t>
             </a:fld>
             <a:endParaRPr lang="en-US" dirty="0"/>
           </a:p>
@@ -2835,7 +2840,7 @@
           <a:p>
             <a:fld id="{4509A250-FF31-4206-8172-F9D3106AACB1}" type="datetimeFigureOut">
               <a:rPr lang="en-US" dirty="0"/>
-              <a:t>8/9/2016</a:t>
+              <a:t>3/4/2017</a:t>
             </a:fld>
             <a:endParaRPr lang="en-US" dirty="0"/>
           </a:p>
@@ -3000,7 +3005,7 @@
           <a:p>
             <a:fld id="{4509A250-FF31-4206-8172-F9D3106AACB1}" type="datetimeFigureOut">
               <a:rPr lang="en-US" dirty="0"/>
-              <a:t>8/9/2016</a:t>
+              <a:t>3/4/2017</a:t>
             </a:fld>
             <a:endParaRPr lang="en-US" dirty="0"/>
           </a:p>
@@ -3175,7 +3180,7 @@
           <a:p>
             <a:fld id="{4509A250-FF31-4206-8172-F9D3106AACB1}" type="datetimeFigureOut">
               <a:rPr lang="en-US" dirty="0"/>
-              <a:t>8/9/2016</a:t>
+              <a:t>3/4/2017</a:t>
             </a:fld>
             <a:endParaRPr lang="en-US" dirty="0"/>
           </a:p>
@@ -3340,7 +3345,7 @@
           <a:p>
             <a:fld id="{4509A250-FF31-4206-8172-F9D3106AACB1}" type="datetimeFigureOut">
               <a:rPr lang="en-US" dirty="0"/>
-              <a:t>8/9/2016</a:t>
+              <a:t>3/4/2017</a:t>
             </a:fld>
             <a:endParaRPr lang="en-US" dirty="0"/>
           </a:p>
@@ -3582,7 +3587,7 @@
           <a:p>
             <a:fld id="{9796027F-7875-4030-9381-8BD8C4F21935}" type="datetimeFigureOut">
               <a:rPr lang="en-US" dirty="0"/>
-              <a:t>8/9/2016</a:t>
+              <a:t>3/4/2017</a:t>
             </a:fld>
             <a:endParaRPr lang="en-US" dirty="0"/>
           </a:p>
@@ -3869,7 +3874,7 @@
           <a:p>
             <a:fld id="{9796027F-7875-4030-9381-8BD8C4F21935}" type="datetimeFigureOut">
               <a:rPr lang="en-US" dirty="0"/>
-              <a:t>8/9/2016</a:t>
+              <a:t>3/4/2017</a:t>
             </a:fld>
             <a:endParaRPr lang="en-US" dirty="0"/>
           </a:p>
@@ -4308,7 +4313,7 @@
           <a:p>
             <a:fld id="{9796027F-7875-4030-9381-8BD8C4F21935}" type="datetimeFigureOut">
               <a:rPr lang="en-US" dirty="0"/>
-              <a:t>8/9/2016</a:t>
+              <a:t>3/4/2017</a:t>
             </a:fld>
             <a:endParaRPr lang="en-US" dirty="0"/>
           </a:p>
@@ -4421,7 +4426,7 @@
           <a:p>
             <a:fld id="{4509A250-FF31-4206-8172-F9D3106AACB1}" type="datetimeFigureOut">
               <a:rPr lang="en-US" dirty="0"/>
-              <a:t>8/9/2016</a:t>
+              <a:t>3/4/2017</a:t>
             </a:fld>
             <a:endParaRPr lang="en-US" dirty="0"/>
           </a:p>
@@ -4511,7 +4516,7 @@
           <a:p>
             <a:fld id="{4509A250-FF31-4206-8172-F9D3106AACB1}" type="datetimeFigureOut">
               <a:rPr lang="en-US" dirty="0"/>
-              <a:t>8/9/2016</a:t>
+              <a:t>3/4/2017</a:t>
             </a:fld>
             <a:endParaRPr lang="en-US" dirty="0"/>
           </a:p>
@@ -4785,7 +4790,7 @@
           <a:p>
             <a:fld id="{4509A250-FF31-4206-8172-F9D3106AACB1}" type="datetimeFigureOut">
               <a:rPr lang="en-US" dirty="0"/>
-              <a:t>8/9/2016</a:t>
+              <a:t>3/4/2017</a:t>
             </a:fld>
             <a:endParaRPr lang="en-US" dirty="0"/>
           </a:p>
@@ -5055,7 +5060,7 @@
           <a:p>
             <a:fld id="{4509A250-FF31-4206-8172-F9D3106AACB1}" type="datetimeFigureOut">
               <a:rPr lang="en-US" dirty="0"/>
-              <a:t>8/9/2016</a:t>
+              <a:t>3/4/2017</a:t>
             </a:fld>
             <a:endParaRPr lang="en-US" dirty="0"/>
           </a:p>
@@ -5479,7 +5484,7 @@
           <a:p>
             <a:fld id="{4AAD347D-5ACD-4C99-B74B-A9C85AD731AF}" type="datetimeFigureOut">
               <a:rPr lang="en-US" dirty="0"/>
-              <a:t>8/9/2016</a:t>
+              <a:t>3/4/2017</a:t>
             </a:fld>
             <a:endParaRPr lang="en-US" dirty="0"/>
           </a:p>
@@ -6056,43 +6061,6 @@
           </a:p>
         </p:txBody>
       </p:sp>
-      <p:sp>
-        <p:nvSpPr>
-          <p:cNvPr id="4" name="文本框 3"/>
-          <p:cNvSpPr txBox="1"/>
-          <p:nvPr/>
-        </p:nvSpPr>
-        <p:spPr>
-          <a:xfrm>
-            <a:off x="9980613" y="5943601"/>
-            <a:ext cx="1412566" cy="646331"/>
-          </a:xfrm>
-          <a:prstGeom prst="rect">
-            <a:avLst/>
-          </a:prstGeom>
-          <a:noFill/>
-        </p:spPr>
-        <p:txBody>
-          <a:bodyPr wrap="none" rtlCol="0">
-            <a:spAutoFit/>
-          </a:bodyPr>
-          <a:lstStyle/>
-          <a:p>
-            <a:r>
-              <a:rPr lang="zh-CN" altLang="en-US" dirty="0"/>
-              <a:t>李兆明</a:t>
-            </a:r>
-            <a:endParaRPr lang="en-US" altLang="zh-CN" dirty="0"/>
-          </a:p>
-          <a:p>
-            <a:r>
-              <a:rPr lang="en-US" altLang="zh-CN" dirty="0"/>
-              <a:t>2016/08/11</a:t>
-            </a:r>
-            <a:endParaRPr lang="zh-CN" altLang="en-US" dirty="0"/>
-          </a:p>
-        </p:txBody>
-      </p:sp>
     </p:spTree>
     <p:extLst>
       <p:ext uri="{BB962C8B-B14F-4D97-AF65-F5344CB8AC3E}">
@@ -9332,14 +9300,14 @@
                 <a:gridCol w="1149805">
                   <a:extLst>
                     <a:ext uri="{9D8B030D-6E8A-4147-A177-3AD203B41FA5}">
-                      <a16:colId xmlns:a16="http://schemas.microsoft.com/office/drawing/2014/main" val="600342399"/>
+                      <a16:colId xmlns:a16="http://schemas.microsoft.com/office/drawing/2014/main" xmlns="" val="600342399"/>
                     </a:ext>
                   </a:extLst>
                 </a:gridCol>
                 <a:gridCol w="1339577">
                   <a:extLst>
                     <a:ext uri="{9D8B030D-6E8A-4147-A177-3AD203B41FA5}">
-                      <a16:colId xmlns:a16="http://schemas.microsoft.com/office/drawing/2014/main" val="3291444375"/>
+                      <a16:colId xmlns:a16="http://schemas.microsoft.com/office/drawing/2014/main" xmlns="" val="3291444375"/>
                     </a:ext>
                   </a:extLst>
                 </a:gridCol>
@@ -9444,7 +9412,7 @@
                 </a:tc>
                 <a:extLst>
                   <a:ext uri="{0D108BD9-81ED-4DB2-BD59-A6C34878D82A}">
-                    <a16:rowId xmlns:a16="http://schemas.microsoft.com/office/drawing/2014/main" val="63539343"/>
+                    <a16:rowId xmlns:a16="http://schemas.microsoft.com/office/drawing/2014/main" xmlns="" val="63539343"/>
                   </a:ext>
                 </a:extLst>
               </a:tr>
@@ -9539,7 +9507,7 @@
                 </a:tc>
                 <a:extLst>
                   <a:ext uri="{0D108BD9-81ED-4DB2-BD59-A6C34878D82A}">
-                    <a16:rowId xmlns:a16="http://schemas.microsoft.com/office/drawing/2014/main" val="2195018437"/>
+                    <a16:rowId xmlns:a16="http://schemas.microsoft.com/office/drawing/2014/main" xmlns="" val="2195018437"/>
                   </a:ext>
                 </a:extLst>
               </a:tr>
@@ -9634,7 +9602,7 @@
                 </a:tc>
                 <a:extLst>
                   <a:ext uri="{0D108BD9-81ED-4DB2-BD59-A6C34878D82A}">
-                    <a16:rowId xmlns:a16="http://schemas.microsoft.com/office/drawing/2014/main" val="3904161767"/>
+                    <a16:rowId xmlns:a16="http://schemas.microsoft.com/office/drawing/2014/main" xmlns="" val="3904161767"/>
                   </a:ext>
                 </a:extLst>
               </a:tr>
@@ -9729,7 +9697,7 @@
                 </a:tc>
                 <a:extLst>
                   <a:ext uri="{0D108BD9-81ED-4DB2-BD59-A6C34878D82A}">
-                    <a16:rowId xmlns:a16="http://schemas.microsoft.com/office/drawing/2014/main" val="56694996"/>
+                    <a16:rowId xmlns:a16="http://schemas.microsoft.com/office/drawing/2014/main" xmlns="" val="56694996"/>
                   </a:ext>
                 </a:extLst>
               </a:tr>

</xml_diff>